<commit_message>
Tiny changes to sample demog spec; nudged over a wordart in the deoverlap demo ppt.
</commit_message>
<xml_diff>
--- a/enrollment/de_overlap/demo_de_overlap.pptx
+++ b/enrollment/de_overlap/demo_de_overlap.pptx
@@ -116,6 +116,22 @@
       </a:defRPr>
     </a:lvl9pPr>
   </p:defaultTextStyle>
+  <p:extLst>
+    <p:ext uri="{EFAFB233-063F-42B5-8137-9DF3F51BA10A}">
+      <p15:sldGuideLst xmlns:p15="http://schemas.microsoft.com/office/powerpoint/2012/main">
+        <p15:guide id="1" orient="horz" pos="2160">
+          <p15:clr>
+            <a:srgbClr val="A4A3A4"/>
+          </p15:clr>
+        </p15:guide>
+        <p15:guide id="2" pos="2880">
+          <p15:clr>
+            <a:srgbClr val="A4A3A4"/>
+          </p15:clr>
+        </p15:guide>
+      </p15:sldGuideLst>
+    </p:ext>
+  </p:extLst>
 </p:presentation>
 </file>
 
@@ -201,7 +217,7 @@
           <a:p>
             <a:fld id="{DF4C3321-4780-471C-B59B-A10B1662BAD3}" type="datetimeFigureOut">
               <a:rPr lang="en-US" smtClean="0"/>
-              <a:t>9/12/2017</a:t>
+              <a:t>1/16/2019</a:t>
             </a:fld>
             <a:endParaRPr lang="en-US"/>
           </a:p>
@@ -265,38 +281,37 @@
           <a:p>
             <a:pPr lvl="0"/>
             <a:r>
-              <a:rPr lang="en-US" smtClean="0"/>
+              <a:rPr lang="en-US"/>
               <a:t>Click to edit Master text styles</a:t>
             </a:r>
           </a:p>
           <a:p>
             <a:pPr lvl="1"/>
             <a:r>
-              <a:rPr lang="en-US" smtClean="0"/>
+              <a:rPr lang="en-US"/>
               <a:t>Second level</a:t>
             </a:r>
           </a:p>
           <a:p>
             <a:pPr lvl="2"/>
             <a:r>
-              <a:rPr lang="en-US" smtClean="0"/>
+              <a:rPr lang="en-US"/>
               <a:t>Third level</a:t>
             </a:r>
           </a:p>
           <a:p>
             <a:pPr lvl="3"/>
             <a:r>
-              <a:rPr lang="en-US" smtClean="0"/>
+              <a:rPr lang="en-US"/>
               <a:t>Fourth level</a:t>
             </a:r>
           </a:p>
           <a:p>
             <a:pPr lvl="4"/>
             <a:r>
-              <a:rPr lang="en-US" smtClean="0"/>
+              <a:rPr lang="en-US"/>
               <a:t>Fifth level</a:t>
             </a:r>
-            <a:endParaRPr lang="en-US"/>
           </a:p>
         </p:txBody>
       </p:sp>
@@ -514,34 +529,34 @@
           <a:lstStyle/>
           <a:p>
             <a:r>
-              <a:rPr lang="en-US" dirty="0" smtClean="0"/>
+              <a:rPr lang="en-US" dirty="0"/>
               <a:t>If there were four horsemen of the enrollment </a:t>
             </a:r>
             <a:r>
-              <a:rPr lang="en-US" dirty="0" err="1" smtClean="0"/>
+              <a:rPr lang="en-US" dirty="0" err="1"/>
               <a:t>datapocalypse</a:t>
             </a:r>
             <a:r>
-              <a:rPr lang="en-US" dirty="0" smtClean="0"/>
+              <a:rPr lang="en-US" dirty="0"/>
               <a:t>,</a:t>
             </a:r>
             <a:r>
-              <a:rPr lang="en-US" baseline="0" dirty="0" smtClean="0"/>
+              <a:rPr lang="en-US" baseline="0" dirty="0"/>
               <a:t> these would be them.</a:t>
             </a:r>
-            <a:endParaRPr lang="en-US" dirty="0" smtClean="0"/>
-          </a:p>
-          <a:p>
-            <a:endParaRPr lang="en-US" dirty="0" smtClean="0"/>
-          </a:p>
-          <a:p>
-            <a:r>
-              <a:rPr lang="en-US" dirty="0" smtClean="0"/>
+            <a:endParaRPr lang="en-US" dirty="0"/>
+          </a:p>
+          <a:p>
+            <a:endParaRPr lang="en-US" dirty="0"/>
+          </a:p>
+          <a:p>
+            <a:r>
+              <a:rPr lang="en-US" dirty="0"/>
               <a:t>That paper can be had at http://www2.sas.com/proceedings/sugi29/260-29.pdf</a:t>
             </a:r>
           </a:p>
           <a:p>
-            <a:endParaRPr lang="en-US" dirty="0" smtClean="0"/>
+            <a:endParaRPr lang="en-US" dirty="0"/>
           </a:p>
         </p:txBody>
       </p:sp>
@@ -643,14 +658,14 @@
               <a:defRPr/>
             </a:pPr>
             <a:r>
-              <a:rPr lang="en-US" dirty="0" smtClean="0"/>
+              <a:rPr lang="en-US" dirty="0"/>
               <a:t>In the last round of QA, overlapping periods was part of a 3-way</a:t>
             </a:r>
             <a:r>
-              <a:rPr lang="en-US" baseline="0" dirty="0" smtClean="0"/>
+              <a:rPr lang="en-US" baseline="0" dirty="0"/>
               <a:t> tie for most-failed check.</a:t>
             </a:r>
-            <a:endParaRPr lang="en-US" dirty="0" smtClean="0"/>
+            <a:endParaRPr lang="en-US" dirty="0"/>
           </a:p>
           <a:p>
             <a:endParaRPr lang="en-US" dirty="0"/>
@@ -738,7 +753,7 @@
           <a:lstStyle/>
           <a:p>
             <a:r>
-              <a:rPr lang="en-US" dirty="0" smtClean="0"/>
+              <a:rPr lang="en-US" dirty="0"/>
               <a:t>Pinpoint URL to the code: https://www.hcsrn.org/share/page/site/VDW/document-details?nodeRef=workspace://SpacesStore/148acf2a-b6ac-4009-b306-8ed20182868a </a:t>
             </a:r>
           </a:p>
@@ -828,10 +843,9 @@
           <a:lstStyle/>
           <a:p>
             <a:r>
-              <a:rPr lang="en-US" smtClean="0"/>
+              <a:rPr lang="en-US"/>
               <a:t>Cut to C:\Users\pardre1\Documents\vdw\Enrollment\supporting_files\demo_de_overlap.sas </a:t>
             </a:r>
-            <a:endParaRPr lang="en-US"/>
           </a:p>
         </p:txBody>
       </p:sp>
@@ -916,39 +930,39 @@
           <a:lstStyle/>
           <a:p>
             <a:r>
-              <a:rPr lang="en-US" dirty="0" smtClean="0"/>
+              <a:rPr lang="en-US" dirty="0"/>
               <a:t>Geographically, these mountains cut the state lengthwise</a:t>
             </a:r>
             <a:r>
-              <a:rPr lang="en-US" baseline="0" dirty="0" smtClean="0"/>
+              <a:rPr lang="en-US" baseline="0" dirty="0"/>
               <a:t> in 1/3</a:t>
             </a:r>
             <a:r>
-              <a:rPr lang="en-US" baseline="30000" dirty="0" smtClean="0"/>
+              <a:rPr lang="en-US" baseline="30000" dirty="0"/>
               <a:t>rd</a:t>
             </a:r>
             <a:r>
-              <a:rPr lang="en-US" baseline="0" dirty="0" smtClean="0"/>
+              <a:rPr lang="en-US" baseline="0" dirty="0"/>
               <a:t> 2/3rds chunks.</a:t>
             </a:r>
           </a:p>
           <a:p>
             <a:r>
-              <a:rPr lang="en-US" baseline="0" dirty="0" smtClean="0"/>
+              <a:rPr lang="en-US" baseline="0" dirty="0"/>
               <a:t>Business-wise, they divide areas of denser population &amp; more complete services (many clinics, including specialty care west of the </a:t>
             </a:r>
             <a:r>
-              <a:rPr lang="en-US" baseline="0" dirty="0" err="1" smtClean="0"/>
+              <a:rPr lang="en-US" baseline="0" dirty="0" err="1"/>
               <a:t>mtns</a:t>
             </a:r>
             <a:r>
-              <a:rPr lang="en-US" baseline="0" dirty="0" smtClean="0"/>
+              <a:rPr lang="en-US" baseline="0" dirty="0"/>
               <a:t>) and less dense/less complete services (fewer locations, no specialty) on the east side.  Many of our EWA locations were acquired in a merger with an organization (confusingly) called Group Health Northwest.</a:t>
             </a:r>
           </a:p>
           <a:p>
             <a:r>
-              <a:rPr lang="en-US" baseline="0" dirty="0" smtClean="0"/>
+              <a:rPr lang="en-US" baseline="0" dirty="0"/>
               <a:t>Researchers at KPWA often want to focus just on people in the West part of the state.  So it’s a variable we have in our enrollment.</a:t>
             </a:r>
             <a:endParaRPr lang="en-US" dirty="0"/>
@@ -1036,34 +1050,34 @@
           <a:lstStyle/>
           <a:p>
             <a:r>
-              <a:rPr lang="en-US" dirty="0" smtClean="0"/>
+              <a:rPr lang="en-US" dirty="0"/>
               <a:t>So it’s much more efficient than you might expect</a:t>
             </a:r>
             <a:r>
-              <a:rPr lang="en-US" baseline="0" dirty="0" smtClean="0"/>
+              <a:rPr lang="en-US" baseline="0" dirty="0"/>
               <a:t> it to be.</a:t>
             </a:r>
-            <a:endParaRPr lang="en-US" dirty="0" smtClean="0"/>
-          </a:p>
-          <a:p>
-            <a:endParaRPr lang="en-US" dirty="0" smtClean="0"/>
-          </a:p>
-          <a:p>
-            <a:r>
-              <a:rPr lang="en-US" dirty="0" smtClean="0"/>
+            <a:endParaRPr lang="en-US" dirty="0"/>
+          </a:p>
+          <a:p>
+            <a:endParaRPr lang="en-US" dirty="0"/>
+          </a:p>
+          <a:p>
+            <a:r>
+              <a:rPr lang="en-US" dirty="0"/>
               <a:t>This</a:t>
             </a:r>
             <a:r>
-              <a:rPr lang="en-US" baseline="0" dirty="0" smtClean="0"/>
+              <a:rPr lang="en-US" baseline="0" dirty="0"/>
               <a:t> is broad-strokes here. To really understand how the code works, do read that SUGI paper. And the code.</a:t>
             </a:r>
           </a:p>
           <a:p>
-            <a:endParaRPr lang="en-US" baseline="0" dirty="0" smtClean="0"/>
-          </a:p>
-          <a:p>
-            <a:r>
-              <a:rPr lang="en-US" baseline="0" dirty="0" smtClean="0"/>
+            <a:endParaRPr lang="en-US" baseline="0" dirty="0"/>
+          </a:p>
+          <a:p>
+            <a:r>
+              <a:rPr lang="en-US" baseline="0" dirty="0"/>
               <a:t>It can be tough to decide which qualitative values should trump which others, but it’s necessary if you want to use this approach.</a:t>
             </a:r>
             <a:endParaRPr lang="en-US" dirty="0"/>
@@ -1151,35 +1165,35 @@
           <a:lstStyle/>
           <a:p>
             <a:r>
-              <a:rPr lang="en-US" dirty="0" smtClean="0"/>
+              <a:rPr lang="en-US" dirty="0"/>
               <a:t>The basic</a:t>
             </a:r>
             <a:r>
-              <a:rPr lang="en-US" baseline="0" dirty="0" smtClean="0"/>
+              <a:rPr lang="en-US" baseline="0" dirty="0"/>
               <a:t> format turns the values into numbers.</a:t>
             </a:r>
           </a:p>
           <a:p>
             <a:r>
-              <a:rPr lang="en-US" baseline="0" dirty="0" smtClean="0"/>
+              <a:rPr lang="en-US" baseline="0" dirty="0"/>
               <a:t>Higher values are favored over lower ones.  So here—Ys plus any other value will come out to Ys.</a:t>
             </a:r>
           </a:p>
           <a:p>
-            <a:endParaRPr lang="en-US" baseline="0" dirty="0" smtClean="0"/>
-          </a:p>
-          <a:p>
-            <a:r>
-              <a:rPr lang="en-US" baseline="0" dirty="0" smtClean="0"/>
+            <a:endParaRPr lang="en-US" baseline="0" dirty="0"/>
+          </a:p>
+          <a:p>
+            <a:r>
+              <a:rPr lang="en-US" baseline="0" dirty="0"/>
               <a:t>The un-do format goes backwards.</a:t>
             </a:r>
           </a:p>
           <a:p>
-            <a:endParaRPr lang="en-US" baseline="0" dirty="0" smtClean="0"/>
-          </a:p>
-          <a:p>
-            <a:r>
-              <a:rPr lang="en-US" baseline="0" dirty="0" smtClean="0"/>
+            <a:endParaRPr lang="en-US" baseline="0" dirty="0"/>
+          </a:p>
+          <a:p>
+            <a:r>
+              <a:rPr lang="en-US" baseline="0" dirty="0"/>
               <a:t>The statement at bottom is how these formats + SQLs max() function combine to resolve any discrepancies that come up.</a:t>
             </a:r>
             <a:endParaRPr lang="en-US" dirty="0"/>
@@ -1267,18 +1281,17 @@
           <a:lstStyle/>
           <a:p>
             <a:r>
-              <a:rPr lang="en-US" dirty="0" smtClean="0"/>
+              <a:rPr lang="en-US" dirty="0"/>
               <a:t>Let’s try it for our </a:t>
             </a:r>
             <a:r>
-              <a:rPr lang="en-US" dirty="0" err="1" smtClean="0"/>
+              <a:rPr lang="en-US" dirty="0" err="1"/>
               <a:t>cascade_side</a:t>
             </a:r>
             <a:r>
-              <a:rPr lang="en-US" dirty="0" smtClean="0"/>
+              <a:rPr lang="en-US" dirty="0"/>
               <a:t> variable!</a:t>
             </a:r>
-            <a:endParaRPr lang="en-US" dirty="0"/>
           </a:p>
         </p:txBody>
       </p:sp>
@@ -1677,7 +1690,7 @@
           </a:lstStyle>
           <a:p>
             <a:r>
-              <a:rPr lang="en-US" smtClean="0"/>
+              <a:rPr lang="en-US"/>
               <a:t>Click to edit Master title style</a:t>
             </a:r>
             <a:endParaRPr lang="en-US" dirty="0"/>
@@ -1796,7 +1809,7 @@
           </a:lstStyle>
           <a:p>
             <a:r>
-              <a:rPr lang="en-US" smtClean="0"/>
+              <a:rPr lang="en-US"/>
               <a:t>Click to edit Master subtitle style</a:t>
             </a:r>
             <a:endParaRPr lang="en-US" dirty="0"/>
@@ -1834,7 +1847,7 @@
             <a:fld id="{1D8BD707-D9CF-40AE-B4C6-C98DA3205C09}" type="datetimeFigureOut">
               <a:rPr lang="en-US" smtClean="0"/>
               <a:pPr/>
-              <a:t>9/12/2017</a:t>
+              <a:t>1/16/2019</a:t>
             </a:fld>
             <a:endParaRPr lang="en-US"/>
           </a:p>
@@ -1915,13 +1928,6 @@
     <a:masterClrMapping/>
   </p:clrMapOvr>
   <p:transition/>
-  <p:timing>
-    <p:tnLst>
-      <p:par>
-        <p:cTn id="1" dur="indefinite" restart="never" nodeType="tmRoot"/>
-      </p:par>
-    </p:tnLst>
-  </p:timing>
 </p:sldLayout>
 </file>
 
@@ -2271,10 +2277,9 @@
           <a:lstStyle/>
           <a:p>
             <a:r>
-              <a:rPr lang="en-US" smtClean="0"/>
+              <a:rPr lang="en-US"/>
               <a:t>Click to edit Master title style</a:t>
             </a:r>
-            <a:endParaRPr lang="en-US"/>
           </a:p>
         </p:txBody>
       </p:sp>
@@ -2300,38 +2305,37 @@
           <a:p>
             <a:pPr lvl="0"/>
             <a:r>
-              <a:rPr lang="en-US" smtClean="0"/>
+              <a:rPr lang="en-US"/>
               <a:t>Click to edit Master text styles</a:t>
             </a:r>
           </a:p>
           <a:p>
             <a:pPr lvl="1"/>
             <a:r>
-              <a:rPr lang="en-US" smtClean="0"/>
+              <a:rPr lang="en-US"/>
               <a:t>Second level</a:t>
             </a:r>
           </a:p>
           <a:p>
             <a:pPr lvl="2"/>
             <a:r>
-              <a:rPr lang="en-US" smtClean="0"/>
+              <a:rPr lang="en-US"/>
               <a:t>Third level</a:t>
             </a:r>
           </a:p>
           <a:p>
             <a:pPr lvl="3"/>
             <a:r>
-              <a:rPr lang="en-US" smtClean="0"/>
+              <a:rPr lang="en-US"/>
               <a:t>Fourth level</a:t>
             </a:r>
           </a:p>
           <a:p>
             <a:pPr lvl="4"/>
             <a:r>
-              <a:rPr lang="en-US" smtClean="0"/>
+              <a:rPr lang="en-US"/>
               <a:t>Fifth level</a:t>
             </a:r>
-            <a:endParaRPr lang="en-US"/>
           </a:p>
         </p:txBody>
       </p:sp>
@@ -2358,7 +2362,7 @@
             <a:fld id="{1D8BD707-D9CF-40AE-B4C6-C98DA3205C09}" type="datetimeFigureOut">
               <a:rPr lang="en-US" smtClean="0"/>
               <a:pPr/>
-              <a:t>9/12/2017</a:t>
+              <a:t>1/16/2019</a:t>
             </a:fld>
             <a:endParaRPr lang="en-US"/>
           </a:p>
@@ -2431,13 +2435,6 @@
     <a:masterClrMapping/>
   </p:clrMapOvr>
   <p:transition/>
-  <p:timing>
-    <p:tnLst>
-      <p:par>
-        <p:cTn id="1" dur="indefinite" restart="never" nodeType="tmRoot"/>
-      </p:par>
-    </p:tnLst>
-  </p:timing>
 </p:sldLayout>
 </file>
 
@@ -2787,7 +2784,7 @@
           <a:lstStyle/>
           <a:p>
             <a:r>
-              <a:rPr lang="en-US" smtClean="0"/>
+              <a:rPr lang="en-US"/>
               <a:t>Click to edit Master title style</a:t>
             </a:r>
             <a:endParaRPr lang="en-US" dirty="0"/>
@@ -2816,35 +2813,35 @@
           <a:p>
             <a:pPr lvl="0"/>
             <a:r>
-              <a:rPr lang="en-US" smtClean="0"/>
+              <a:rPr lang="en-US"/>
               <a:t>Click to edit Master text styles</a:t>
             </a:r>
           </a:p>
           <a:p>
             <a:pPr lvl="1"/>
             <a:r>
-              <a:rPr lang="en-US" smtClean="0"/>
+              <a:rPr lang="en-US"/>
               <a:t>Second level</a:t>
             </a:r>
           </a:p>
           <a:p>
             <a:pPr lvl="2"/>
             <a:r>
-              <a:rPr lang="en-US" smtClean="0"/>
+              <a:rPr lang="en-US"/>
               <a:t>Third level</a:t>
             </a:r>
           </a:p>
           <a:p>
             <a:pPr lvl="3"/>
             <a:r>
-              <a:rPr lang="en-US" smtClean="0"/>
+              <a:rPr lang="en-US"/>
               <a:t>Fourth level</a:t>
             </a:r>
           </a:p>
           <a:p>
             <a:pPr lvl="4"/>
             <a:r>
-              <a:rPr lang="en-US" smtClean="0"/>
+              <a:rPr lang="en-US"/>
               <a:t>Fifth level</a:t>
             </a:r>
             <a:endParaRPr lang="en-US" dirty="0"/>
@@ -2878,7 +2875,7 @@
             <a:fld id="{1D8BD707-D9CF-40AE-B4C6-C98DA3205C09}" type="datetimeFigureOut">
               <a:rPr lang="en-US" smtClean="0"/>
               <a:pPr/>
-              <a:t>9/12/2017</a:t>
+              <a:t>1/16/2019</a:t>
             </a:fld>
             <a:endParaRPr lang="en-US"/>
           </a:p>
@@ -2951,13 +2948,6 @@
     <a:masterClrMapping/>
   </p:clrMapOvr>
   <p:transition/>
-  <p:timing>
-    <p:tnLst>
-      <p:par>
-        <p:cTn id="1" dur="indefinite" restart="never" nodeType="tmRoot"/>
-      </p:par>
-    </p:tnLst>
-  </p:timing>
 </p:sldLayout>
 </file>
 
@@ -3307,10 +3297,9 @@
           <a:lstStyle/>
           <a:p>
             <a:r>
-              <a:rPr lang="en-US" smtClean="0"/>
+              <a:rPr lang="en-US"/>
               <a:t>Click to edit Master title style</a:t>
             </a:r>
-            <a:endParaRPr lang="en-US"/>
           </a:p>
         </p:txBody>
       </p:sp>
@@ -3357,38 +3346,37 @@
           <a:p>
             <a:pPr lvl="0"/>
             <a:r>
-              <a:rPr lang="en-US" dirty="0" smtClean="0"/>
+              <a:rPr lang="en-US" dirty="0"/>
               <a:t>Click to edit Master text styles</a:t>
             </a:r>
           </a:p>
           <a:p>
             <a:pPr lvl="1"/>
             <a:r>
-              <a:rPr lang="en-US" dirty="0" smtClean="0"/>
+              <a:rPr lang="en-US" dirty="0"/>
               <a:t>Second level</a:t>
             </a:r>
           </a:p>
           <a:p>
             <a:pPr lvl="2"/>
             <a:r>
-              <a:rPr lang="en-US" dirty="0" smtClean="0"/>
+              <a:rPr lang="en-US" dirty="0"/>
               <a:t>Third level</a:t>
             </a:r>
           </a:p>
           <a:p>
             <a:pPr lvl="3"/>
             <a:r>
-              <a:rPr lang="en-US" dirty="0" smtClean="0"/>
+              <a:rPr lang="en-US" dirty="0"/>
               <a:t>Fourth level</a:t>
             </a:r>
           </a:p>
           <a:p>
             <a:pPr lvl="4"/>
             <a:r>
-              <a:rPr lang="en-US" dirty="0" smtClean="0"/>
+              <a:rPr lang="en-US" dirty="0"/>
               <a:t>Fifth level</a:t>
             </a:r>
-            <a:endParaRPr lang="en-US" dirty="0"/>
           </a:p>
         </p:txBody>
       </p:sp>
@@ -3415,7 +3403,7 @@
             <a:fld id="{1D8BD707-D9CF-40AE-B4C6-C98DA3205C09}" type="datetimeFigureOut">
               <a:rPr lang="en-US" smtClean="0"/>
               <a:pPr/>
-              <a:t>9/12/2017</a:t>
+              <a:t>1/16/2019</a:t>
             </a:fld>
             <a:endParaRPr lang="en-US"/>
           </a:p>
@@ -3480,13 +3468,6 @@
     <a:masterClrMapping/>
   </p:clrMapOvr>
   <p:transition/>
-  <p:timing>
-    <p:tnLst>
-      <p:par>
-        <p:cTn id="1" dur="indefinite" restart="never" nodeType="tmRoot"/>
-      </p:par>
-    </p:tnLst>
-  </p:timing>
 </p:sldLayout>
 </file>
 
@@ -3842,7 +3823,7 @@
           </a:lstStyle>
           <a:p>
             <a:r>
-              <a:rPr lang="en-US" smtClean="0"/>
+              <a:rPr lang="en-US"/>
               <a:t>Click to edit Master title style</a:t>
             </a:r>
             <a:endParaRPr lang="en-US" dirty="0"/>
@@ -3964,7 +3945,7 @@
           <a:p>
             <a:pPr lvl="0"/>
             <a:r>
-              <a:rPr lang="en-US" smtClean="0"/>
+              <a:rPr lang="en-US"/>
               <a:t>Click to edit Master text styles</a:t>
             </a:r>
           </a:p>
@@ -3997,7 +3978,7 @@
             <a:fld id="{1D8BD707-D9CF-40AE-B4C6-C98DA3205C09}" type="datetimeFigureOut">
               <a:rPr lang="en-US" smtClean="0"/>
               <a:pPr/>
-              <a:t>9/12/2017</a:t>
+              <a:t>1/16/2019</a:t>
             </a:fld>
             <a:endParaRPr lang="en-US"/>
           </a:p>
@@ -4066,13 +4047,6 @@
     <a:masterClrMapping/>
   </p:clrMapOvr>
   <p:transition/>
-  <p:timing>
-    <p:tnLst>
-      <p:par>
-        <p:cTn id="1" dur="indefinite" restart="never" nodeType="tmRoot"/>
-      </p:par>
-    </p:tnLst>
-  </p:timing>
 </p:sldLayout>
 </file>
 
@@ -4422,10 +4396,9 @@
           <a:lstStyle/>
           <a:p>
             <a:r>
-              <a:rPr lang="en-US" smtClean="0"/>
+              <a:rPr lang="en-US"/>
               <a:t>Click to edit Master title style</a:t>
             </a:r>
-            <a:endParaRPr lang="en-US"/>
           </a:p>
         </p:txBody>
       </p:sp>
@@ -4479,35 +4452,35 @@
           <a:p>
             <a:pPr lvl="0"/>
             <a:r>
-              <a:rPr lang="en-US" smtClean="0"/>
+              <a:rPr lang="en-US"/>
               <a:t>Click to edit Master text styles</a:t>
             </a:r>
           </a:p>
           <a:p>
             <a:pPr lvl="1"/>
             <a:r>
-              <a:rPr lang="en-US" smtClean="0"/>
+              <a:rPr lang="en-US"/>
               <a:t>Second level</a:t>
             </a:r>
           </a:p>
           <a:p>
             <a:pPr lvl="2"/>
             <a:r>
-              <a:rPr lang="en-US" smtClean="0"/>
+              <a:rPr lang="en-US"/>
               <a:t>Third level</a:t>
             </a:r>
           </a:p>
           <a:p>
             <a:pPr lvl="3"/>
             <a:r>
-              <a:rPr lang="en-US" smtClean="0"/>
+              <a:rPr lang="en-US"/>
               <a:t>Fourth level</a:t>
             </a:r>
           </a:p>
           <a:p>
             <a:pPr lvl="4"/>
             <a:r>
-              <a:rPr lang="en-US" smtClean="0"/>
+              <a:rPr lang="en-US"/>
               <a:t>Fifth level</a:t>
             </a:r>
             <a:endParaRPr lang="en-US" dirty="0"/>
@@ -4564,35 +4537,35 @@
           <a:p>
             <a:pPr lvl="0"/>
             <a:r>
-              <a:rPr lang="en-US" smtClean="0"/>
+              <a:rPr lang="en-US"/>
               <a:t>Click to edit Master text styles</a:t>
             </a:r>
           </a:p>
           <a:p>
             <a:pPr lvl="1"/>
             <a:r>
-              <a:rPr lang="en-US" smtClean="0"/>
+              <a:rPr lang="en-US"/>
               <a:t>Second level</a:t>
             </a:r>
           </a:p>
           <a:p>
             <a:pPr lvl="2"/>
             <a:r>
-              <a:rPr lang="en-US" smtClean="0"/>
+              <a:rPr lang="en-US"/>
               <a:t>Third level</a:t>
             </a:r>
           </a:p>
           <a:p>
             <a:pPr lvl="3"/>
             <a:r>
-              <a:rPr lang="en-US" smtClean="0"/>
+              <a:rPr lang="en-US"/>
               <a:t>Fourth level</a:t>
             </a:r>
           </a:p>
           <a:p>
             <a:pPr lvl="4"/>
             <a:r>
-              <a:rPr lang="en-US" smtClean="0"/>
+              <a:rPr lang="en-US"/>
               <a:t>Fifth level</a:t>
             </a:r>
             <a:endParaRPr lang="en-US" dirty="0"/>
@@ -4626,7 +4599,7 @@
             <a:fld id="{1D8BD707-D9CF-40AE-B4C6-C98DA3205C09}" type="datetimeFigureOut">
               <a:rPr lang="en-US" smtClean="0"/>
               <a:pPr/>
-              <a:t>9/12/2017</a:t>
+              <a:t>1/16/2019</a:t>
             </a:fld>
             <a:endParaRPr lang="en-US"/>
           </a:p>
@@ -4699,13 +4672,6 @@
     <a:masterClrMapping/>
   </p:clrMapOvr>
   <p:transition/>
-  <p:timing>
-    <p:tnLst>
-      <p:par>
-        <p:cTn id="1" dur="indefinite" restart="never" nodeType="tmRoot"/>
-      </p:par>
-    </p:tnLst>
-  </p:timing>
 </p:sldLayout>
 </file>
 
@@ -5059,10 +5025,9 @@
           </a:lstStyle>
           <a:p>
             <a:r>
-              <a:rPr lang="en-US" smtClean="0"/>
+              <a:rPr lang="en-US"/>
               <a:t>Click to edit Master title style</a:t>
             </a:r>
-            <a:endParaRPr lang="en-US"/>
           </a:p>
         </p:txBody>
       </p:sp>
@@ -5125,7 +5090,7 @@
           <a:p>
             <a:pPr lvl="0"/>
             <a:r>
-              <a:rPr lang="en-US" smtClean="0"/>
+              <a:rPr lang="en-US"/>
               <a:t>Click to edit Master text styles</a:t>
             </a:r>
           </a:p>
@@ -5181,38 +5146,37 @@
           <a:p>
             <a:pPr lvl="0"/>
             <a:r>
-              <a:rPr lang="en-US" smtClean="0"/>
+              <a:rPr lang="en-US"/>
               <a:t>Click to edit Master text styles</a:t>
             </a:r>
           </a:p>
           <a:p>
             <a:pPr lvl="1"/>
             <a:r>
-              <a:rPr lang="en-US" smtClean="0"/>
+              <a:rPr lang="en-US"/>
               <a:t>Second level</a:t>
             </a:r>
           </a:p>
           <a:p>
             <a:pPr lvl="2"/>
             <a:r>
-              <a:rPr lang="en-US" smtClean="0"/>
+              <a:rPr lang="en-US"/>
               <a:t>Third level</a:t>
             </a:r>
           </a:p>
           <a:p>
             <a:pPr lvl="3"/>
             <a:r>
-              <a:rPr lang="en-US" smtClean="0"/>
+              <a:rPr lang="en-US"/>
               <a:t>Fourth level</a:t>
             </a:r>
           </a:p>
           <a:p>
             <a:pPr lvl="4"/>
             <a:r>
-              <a:rPr lang="en-US" smtClean="0"/>
+              <a:rPr lang="en-US"/>
               <a:t>Fifth level</a:t>
             </a:r>
-            <a:endParaRPr lang="en-US"/>
           </a:p>
         </p:txBody>
       </p:sp>
@@ -5275,7 +5239,7 @@
           <a:p>
             <a:pPr lvl="0"/>
             <a:r>
-              <a:rPr lang="en-US" smtClean="0"/>
+              <a:rPr lang="en-US"/>
               <a:t>Click to edit Master text styles</a:t>
             </a:r>
           </a:p>
@@ -5331,35 +5295,35 @@
           <a:p>
             <a:pPr lvl="0"/>
             <a:r>
-              <a:rPr lang="en-US" smtClean="0"/>
+              <a:rPr lang="en-US"/>
               <a:t>Click to edit Master text styles</a:t>
             </a:r>
           </a:p>
           <a:p>
             <a:pPr lvl="1"/>
             <a:r>
-              <a:rPr lang="en-US" smtClean="0"/>
+              <a:rPr lang="en-US"/>
               <a:t>Second level</a:t>
             </a:r>
           </a:p>
           <a:p>
             <a:pPr lvl="2"/>
             <a:r>
-              <a:rPr lang="en-US" smtClean="0"/>
+              <a:rPr lang="en-US"/>
               <a:t>Third level</a:t>
             </a:r>
           </a:p>
           <a:p>
             <a:pPr lvl="3"/>
             <a:r>
-              <a:rPr lang="en-US" smtClean="0"/>
+              <a:rPr lang="en-US"/>
               <a:t>Fourth level</a:t>
             </a:r>
           </a:p>
           <a:p>
             <a:pPr lvl="4"/>
             <a:r>
-              <a:rPr lang="en-US" smtClean="0"/>
+              <a:rPr lang="en-US"/>
               <a:t>Fifth level</a:t>
             </a:r>
             <a:endParaRPr lang="en-US" dirty="0"/>
@@ -5393,7 +5357,7 @@
             <a:fld id="{1D8BD707-D9CF-40AE-B4C6-C98DA3205C09}" type="datetimeFigureOut">
               <a:rPr lang="en-US" smtClean="0"/>
               <a:pPr/>
-              <a:t>9/12/2017</a:t>
+              <a:t>1/16/2019</a:t>
             </a:fld>
             <a:endParaRPr lang="en-US"/>
           </a:p>
@@ -5466,13 +5430,6 @@
     <a:masterClrMapping/>
   </p:clrMapOvr>
   <p:transition/>
-  <p:timing>
-    <p:tnLst>
-      <p:par>
-        <p:cTn id="1" dur="indefinite" restart="never" nodeType="tmRoot"/>
-      </p:par>
-    </p:tnLst>
-  </p:timing>
 </p:sldLayout>
 </file>
 
@@ -5822,10 +5779,9 @@
           <a:lstStyle/>
           <a:p>
             <a:r>
-              <a:rPr lang="en-US" smtClean="0"/>
+              <a:rPr lang="en-US"/>
               <a:t>Click to edit Master title style</a:t>
             </a:r>
-            <a:endParaRPr lang="en-US"/>
           </a:p>
         </p:txBody>
       </p:sp>
@@ -5852,7 +5808,7 @@
             <a:fld id="{1D8BD707-D9CF-40AE-B4C6-C98DA3205C09}" type="datetimeFigureOut">
               <a:rPr lang="en-US" smtClean="0"/>
               <a:pPr/>
-              <a:t>9/12/2017</a:t>
+              <a:t>1/16/2019</a:t>
             </a:fld>
             <a:endParaRPr lang="en-US"/>
           </a:p>
@@ -5917,13 +5873,6 @@
     <a:masterClrMapping/>
   </p:clrMapOvr>
   <p:transition/>
-  <p:timing>
-    <p:tnLst>
-      <p:par>
-        <p:cTn id="1" dur="indefinite" restart="never" nodeType="tmRoot"/>
-      </p:par>
-    </p:tnLst>
-  </p:timing>
 </p:sldLayout>
 </file>
 
@@ -6279,7 +6228,7 @@
             <a:fld id="{1D8BD707-D9CF-40AE-B4C6-C98DA3205C09}" type="datetimeFigureOut">
               <a:rPr lang="en-US" smtClean="0"/>
               <a:pPr/>
-              <a:t>9/12/2017</a:t>
+              <a:t>1/16/2019</a:t>
             </a:fld>
             <a:endParaRPr lang="en-US"/>
           </a:p>
@@ -6352,13 +6301,6 @@
     <a:masterClrMapping/>
   </p:clrMapOvr>
   <p:transition/>
-  <p:timing>
-    <p:tnLst>
-      <p:par>
-        <p:cTn id="1" dur="indefinite" restart="never" nodeType="tmRoot"/>
-      </p:par>
-    </p:tnLst>
-  </p:timing>
 </p:sldLayout>
 </file>
 
@@ -6712,7 +6654,7 @@
           </a:lstStyle>
           <a:p>
             <a:r>
-              <a:rPr lang="en-US" smtClean="0"/>
+              <a:rPr lang="en-US"/>
               <a:t>Click to edit Master title style</a:t>
             </a:r>
             <a:endParaRPr lang="en-US" dirty="0"/>
@@ -6769,35 +6711,35 @@
           <a:p>
             <a:pPr lvl="0"/>
             <a:r>
-              <a:rPr lang="en-US" smtClean="0"/>
+              <a:rPr lang="en-US"/>
               <a:t>Click to edit Master text styles</a:t>
             </a:r>
           </a:p>
           <a:p>
             <a:pPr lvl="1"/>
             <a:r>
-              <a:rPr lang="en-US" smtClean="0"/>
+              <a:rPr lang="en-US"/>
               <a:t>Second level</a:t>
             </a:r>
           </a:p>
           <a:p>
             <a:pPr lvl="2"/>
             <a:r>
-              <a:rPr lang="en-US" smtClean="0"/>
+              <a:rPr lang="en-US"/>
               <a:t>Third level</a:t>
             </a:r>
           </a:p>
           <a:p>
             <a:pPr lvl="3"/>
             <a:r>
-              <a:rPr lang="en-US" smtClean="0"/>
+              <a:rPr lang="en-US"/>
               <a:t>Fourth level</a:t>
             </a:r>
           </a:p>
           <a:p>
             <a:pPr lvl="4"/>
             <a:r>
-              <a:rPr lang="en-US" smtClean="0"/>
+              <a:rPr lang="en-US"/>
               <a:t>Fifth level</a:t>
             </a:r>
             <a:endParaRPr lang="en-US" dirty="0"/>
@@ -6865,7 +6807,7 @@
           <a:p>
             <a:pPr lvl="0"/>
             <a:r>
-              <a:rPr lang="en-US" smtClean="0"/>
+              <a:rPr lang="en-US"/>
               <a:t>Click to edit Master text styles</a:t>
             </a:r>
           </a:p>
@@ -6898,7 +6840,7 @@
             <a:fld id="{1D8BD707-D9CF-40AE-B4C6-C98DA3205C09}" type="datetimeFigureOut">
               <a:rPr lang="en-US" smtClean="0"/>
               <a:pPr/>
-              <a:t>9/12/2017</a:t>
+              <a:t>1/16/2019</a:t>
             </a:fld>
             <a:endParaRPr lang="en-US"/>
           </a:p>
@@ -6971,13 +6913,6 @@
     <a:masterClrMapping/>
   </p:clrMapOvr>
   <p:transition/>
-  <p:timing>
-    <p:tnLst>
-      <p:par>
-        <p:cTn id="1" dur="indefinite" restart="never" nodeType="tmRoot"/>
-      </p:par>
-    </p:tnLst>
-  </p:timing>
 </p:sldLayout>
 </file>
 
@@ -7333,10 +7268,9 @@
           </a:lstStyle>
           <a:p>
             <a:r>
-              <a:rPr lang="en-US" smtClean="0"/>
+              <a:rPr lang="en-US"/>
               <a:t>Click to edit Master title style</a:t>
             </a:r>
-            <a:endParaRPr lang="en-US"/>
           </a:p>
         </p:txBody>
       </p:sp>
@@ -7415,10 +7349,9 @@
           </a:lstStyle>
           <a:p>
             <a:r>
-              <a:rPr lang="en-US" smtClean="0"/>
+              <a:rPr lang="en-US"/>
               <a:t>Click icon to add picture</a:t>
             </a:r>
-            <a:endParaRPr lang="en-US"/>
           </a:p>
         </p:txBody>
       </p:sp>
@@ -7483,7 +7416,7 @@
           <a:p>
             <a:pPr lvl="0"/>
             <a:r>
-              <a:rPr lang="en-US" smtClean="0"/>
+              <a:rPr lang="en-US"/>
               <a:t>Click to edit Master text styles</a:t>
             </a:r>
           </a:p>
@@ -7516,7 +7449,7 @@
             <a:fld id="{1D8BD707-D9CF-40AE-B4C6-C98DA3205C09}" type="datetimeFigureOut">
               <a:rPr lang="en-US" smtClean="0"/>
               <a:pPr/>
-              <a:t>9/12/2017</a:t>
+              <a:t>1/16/2019</a:t>
             </a:fld>
             <a:endParaRPr lang="en-US"/>
           </a:p>
@@ -7589,13 +7522,6 @@
     <a:masterClrMapping/>
   </p:clrMapOvr>
   <p:transition/>
-  <p:timing>
-    <p:tnLst>
-      <p:par>
-        <p:cTn id="1" dur="indefinite" restart="never" nodeType="tmRoot"/>
-      </p:par>
-    </p:tnLst>
-  </p:timing>
 </p:sldLayout>
 </file>
 
@@ -7673,7 +7599,7 @@
           <a:lstStyle/>
           <a:p>
             <a:r>
-              <a:rPr lang="en-US" smtClean="0"/>
+              <a:rPr lang="en-US"/>
               <a:t>Click to edit Master title style</a:t>
             </a:r>
             <a:endParaRPr lang="en-US" dirty="0"/>
@@ -7707,35 +7633,35 @@
           <a:p>
             <a:pPr lvl="0"/>
             <a:r>
-              <a:rPr lang="en-US" smtClean="0"/>
+              <a:rPr lang="en-US"/>
               <a:t>Click to edit Master text styles</a:t>
             </a:r>
           </a:p>
           <a:p>
             <a:pPr lvl="1"/>
             <a:r>
-              <a:rPr lang="en-US" smtClean="0"/>
+              <a:rPr lang="en-US"/>
               <a:t>Second level</a:t>
             </a:r>
           </a:p>
           <a:p>
             <a:pPr lvl="2"/>
             <a:r>
-              <a:rPr lang="en-US" smtClean="0"/>
+              <a:rPr lang="en-US"/>
               <a:t>Third level</a:t>
             </a:r>
           </a:p>
           <a:p>
             <a:pPr lvl="3"/>
             <a:r>
-              <a:rPr lang="en-US" smtClean="0"/>
+              <a:rPr lang="en-US"/>
               <a:t>Fourth level</a:t>
             </a:r>
           </a:p>
           <a:p>
             <a:pPr lvl="4"/>
             <a:r>
-              <a:rPr lang="en-US" smtClean="0"/>
+              <a:rPr lang="en-US"/>
               <a:t>Fifth level</a:t>
             </a:r>
             <a:endParaRPr lang="en-US" dirty="0"/>
@@ -7779,7 +7705,7 @@
             <a:fld id="{1D8BD707-D9CF-40AE-B4C6-C98DA3205C09}" type="datetimeFigureOut">
               <a:rPr lang="en-US" smtClean="0"/>
               <a:pPr/>
-              <a:t>9/12/2017</a:t>
+              <a:t>1/16/2019</a:t>
             </a:fld>
             <a:endParaRPr lang="en-US"/>
           </a:p>
@@ -7881,13 +7807,6 @@
     <p:sldLayoutId id="2147483887" r:id="rId11"/>
   </p:sldLayoutIdLst>
   <p:transition/>
-  <p:timing>
-    <p:tnLst>
-      <p:par>
-        <p:cTn id="1" dur="indefinite" restart="never" nodeType="tmRoot"/>
-      </p:par>
-    </p:tnLst>
-  </p:timing>
   <p:txStyles>
     <p:titleStyle>
       <a:lvl1pPr algn="r" defTabSz="914400" rtl="0" eaLnBrk="1" latinLnBrk="0" hangingPunct="1">
@@ -8342,10 +8261,9 @@
           <a:lstStyle/>
           <a:p>
             <a:r>
-              <a:rPr lang="en-US" dirty="0" smtClean="0"/>
+              <a:rPr lang="en-US" dirty="0"/>
               <a:t>%de_overlap HOWTO</a:t>
             </a:r>
-            <a:endParaRPr lang="en-US" dirty="0"/>
           </a:p>
         </p:txBody>
       </p:sp>
@@ -8367,22 +8285,21 @@
           <a:lstStyle/>
           <a:p>
             <a:r>
-              <a:rPr lang="en-US" dirty="0" smtClean="0"/>
+              <a:rPr lang="en-US" dirty="0"/>
               <a:t>Roy Pardee</a:t>
             </a:r>
           </a:p>
           <a:p>
             <a:r>
-              <a:rPr lang="en-US" dirty="0" smtClean="0"/>
+              <a:rPr lang="en-US" dirty="0"/>
               <a:t>VIG Mid-Year Meeting 2017</a:t>
             </a:r>
           </a:p>
           <a:p>
             <a:r>
-              <a:rPr lang="en-US" dirty="0" smtClean="0"/>
+              <a:rPr lang="en-US" dirty="0"/>
               <a:t>Boston MA</a:t>
             </a:r>
-            <a:endParaRPr lang="en-US" dirty="0"/>
           </a:p>
         </p:txBody>
       </p:sp>
@@ -8397,13 +8314,6 @@
     <a:masterClrMapping/>
   </p:clrMapOvr>
   <p:transition/>
-  <p:timing>
-    <p:tnLst>
-      <p:par>
-        <p:cTn id="1" dur="indefinite" restart="never" nodeType="tmRoot"/>
-      </p:par>
-    </p:tnLst>
-  </p:timing>
 </p:sld>
 </file>
 
@@ -8440,10 +8350,9 @@
           <a:lstStyle/>
           <a:p>
             <a:r>
-              <a:rPr lang="en-US" dirty="0" smtClean="0"/>
+              <a:rPr lang="en-US" dirty="0"/>
               <a:t>Questions?</a:t>
             </a:r>
-            <a:endParaRPr lang="en-US" dirty="0"/>
           </a:p>
         </p:txBody>
       </p:sp>
@@ -8463,10 +8372,9 @@
           <a:lstStyle/>
           <a:p>
             <a:r>
-              <a:rPr lang="en-US" dirty="0" smtClean="0"/>
+              <a:rPr lang="en-US" dirty="0"/>
               <a:t>Thank You!</a:t>
             </a:r>
-            <a:endParaRPr lang="en-US" dirty="0"/>
           </a:p>
         </p:txBody>
       </p:sp>
@@ -8517,10 +8425,9 @@
           <a:lstStyle/>
           <a:p>
             <a:r>
-              <a:rPr lang="en-US" dirty="0" smtClean="0"/>
+              <a:rPr lang="en-US" dirty="0"/>
               <a:t>What is it?</a:t>
             </a:r>
-            <a:endParaRPr lang="en-US" dirty="0"/>
           </a:p>
         </p:txBody>
       </p:sp>
@@ -8542,64 +8449,43 @@
           <a:lstStyle/>
           <a:p>
             <a:r>
-              <a:rPr lang="en-US" dirty="0" smtClean="0"/>
+              <a:rPr lang="en-US" dirty="0"/>
               <a:t>A utility macro that:</a:t>
             </a:r>
           </a:p>
           <a:p>
             <a:pPr lvl="1"/>
             <a:r>
-              <a:rPr lang="en-US" dirty="0" smtClean="0"/>
+              <a:rPr lang="en-US" dirty="0"/>
               <a:t>Collapses any overlapping periods in your enrollment data.</a:t>
             </a:r>
           </a:p>
           <a:p>
             <a:pPr lvl="1"/>
             <a:r>
-              <a:rPr lang="en-US" dirty="0" smtClean="0"/>
+              <a:rPr lang="en-US" dirty="0"/>
               <a:t>Reconciles any conflicting information on said overlaps.</a:t>
             </a:r>
           </a:p>
           <a:p>
             <a:pPr lvl="1"/>
             <a:r>
-              <a:rPr lang="en-US" dirty="0" smtClean="0"/>
+              <a:rPr lang="en-US" dirty="0"/>
               <a:t>Collapses any contiguous periods of enrollment.</a:t>
             </a:r>
           </a:p>
           <a:p>
             <a:pPr lvl="1"/>
             <a:r>
-              <a:rPr lang="en-US" dirty="0" smtClean="0"/>
+              <a:rPr lang="en-US" dirty="0"/>
               <a:t>Removes any duplicated records.</a:t>
             </a:r>
           </a:p>
           <a:p>
             <a:r>
-              <a:rPr lang="en-US" dirty="0" smtClean="0"/>
-              <a:t>Credit: </a:t>
-            </a:r>
-            <a:r>
               <a:rPr lang="en-US" dirty="0"/>
-              <a:t>Mike Rhoads SUGI 29 </a:t>
-            </a:r>
-            <a:r>
-              <a:rPr lang="en-US" dirty="0" smtClean="0"/>
-              <a:t>paper </a:t>
-            </a:r>
-            <a:r>
-              <a:rPr lang="en-US" dirty="0"/>
-              <a:t>Starts and Stops</a:t>
-            </a:r>
-            <a:r>
-              <a:rPr lang="en-US" dirty="0" smtClean="0"/>
-              <a:t>: </a:t>
-            </a:r>
-            <a:r>
-              <a:rPr lang="en-US" dirty="0"/>
-              <a:t>Processing Episode Data With Beginning and Ending Dates</a:t>
-            </a:r>
-            <a:endParaRPr lang="en-US" dirty="0" smtClean="0"/>
+              <a:t>Credit: Mike Rhoads SUGI 29 paper Starts and Stops: Processing Episode Data With Beginning and Ending Dates</a:t>
+            </a:r>
           </a:p>
         </p:txBody>
       </p:sp>
@@ -8614,13 +8500,6 @@
     <a:masterClrMapping/>
   </p:clrMapOvr>
   <p:transition/>
-  <p:timing>
-    <p:tnLst>
-      <p:par>
-        <p:cTn id="1" dur="indefinite" restart="never" nodeType="tmRoot"/>
-      </p:par>
-    </p:tnLst>
-  </p:timing>
 </p:sld>
 </file>
 
@@ -8657,10 +8536,9 @@
           <a:lstStyle/>
           <a:p>
             <a:r>
-              <a:rPr lang="en-US" dirty="0" smtClean="0"/>
+              <a:rPr lang="en-US" dirty="0"/>
               <a:t>Useful For</a:t>
             </a:r>
-            <a:endParaRPr lang="en-US" dirty="0"/>
           </a:p>
         </p:txBody>
       </p:sp>
@@ -8680,26 +8558,14 @@
           <a:lstStyle/>
           <a:p>
             <a:r>
-              <a:rPr lang="en-US" dirty="0" smtClean="0"/>
-              <a:t>Cleaning </a:t>
-            </a:r>
-            <a:r>
               <a:rPr lang="en-US" dirty="0"/>
-              <a:t>your enrollment data.</a:t>
+              <a:t>Cleaning your enrollment data.</a:t>
             </a:r>
           </a:p>
           <a:p>
             <a:r>
               <a:rPr lang="en-US" dirty="0"/>
-              <a:t>Combining enrollment </a:t>
-            </a:r>
-            <a:r>
-              <a:rPr lang="en-US" dirty="0" smtClean="0"/>
-              <a:t>information coming </a:t>
-            </a:r>
-            <a:r>
-              <a:rPr lang="en-US" dirty="0"/>
-              <a:t>from disparate sources.</a:t>
+              <a:t>Combining enrollment information coming from disparate sources.</a:t>
             </a:r>
           </a:p>
           <a:p>
@@ -8738,13 +8604,6 @@
     <a:masterClrMapping/>
   </p:clrMapOvr>
   <p:transition/>
-  <p:timing>
-    <p:tnLst>
-      <p:par>
-        <p:cTn id="1" dur="indefinite" restart="never" nodeType="tmRoot"/>
-      </p:par>
-    </p:tnLst>
-  </p:timing>
 </p:sld>
 </file>
 
@@ -8781,10 +8640,9 @@
           <a:lstStyle/>
           <a:p>
             <a:r>
-              <a:rPr lang="en-US" dirty="0" smtClean="0"/>
+              <a:rPr lang="en-US" dirty="0"/>
               <a:t>Why The Fuss?</a:t>
             </a:r>
-            <a:endParaRPr lang="en-US" dirty="0"/>
           </a:p>
         </p:txBody>
       </p:sp>
@@ -8806,50 +8664,42 @@
           <a:lstStyle/>
           <a:p>
             <a:r>
-              <a:rPr lang="en-US" dirty="0" smtClean="0"/>
+              <a:rPr lang="en-US" dirty="0"/>
               <a:t>Raise visibility.</a:t>
             </a:r>
           </a:p>
           <a:p>
             <a:r>
-              <a:rPr lang="en-US" dirty="0" smtClean="0"/>
-              <a:t>Very </a:t>
-            </a:r>
-            <a:r>
-              <a:rPr lang="en-US" dirty="0" smtClean="0"/>
-              <a:t>simple / straightforward </a:t>
-            </a:r>
-            <a:r>
-              <a:rPr lang="en-US" dirty="0" smtClean="0"/>
-              <a:t>to use if you’ve only ever got the stock VDW variables in enrollment.</a:t>
-            </a:r>
-          </a:p>
-          <a:p>
-            <a:r>
-              <a:rPr lang="en-US" dirty="0" smtClean="0"/>
+              <a:rPr lang="en-US" dirty="0"/>
+              <a:t>Very simple / straightforward to use if you’ve only ever got the stock VDW variables in enrollment.</a:t>
+            </a:r>
+          </a:p>
+          <a:p>
+            <a:r>
+              <a:rPr lang="en-US" dirty="0"/>
               <a:t>But if you’ve got off-spec vars you want to keep, you’ve got to do some significant editing.</a:t>
             </a:r>
           </a:p>
           <a:p>
             <a:pPr lvl="1"/>
             <a:r>
-              <a:rPr lang="en-US" dirty="0" smtClean="0"/>
+              <a:rPr lang="en-US" dirty="0"/>
               <a:t>So it’s </a:t>
             </a:r>
             <a:r>
-              <a:rPr lang="en-US" dirty="0" smtClean="0">
+              <a:rPr lang="en-US" dirty="0">
                 <a:hlinkClick r:id="rId3"/>
               </a:rPr>
               <a:t>distributed as downloadable/editable code</a:t>
             </a:r>
             <a:r>
-              <a:rPr lang="en-US" dirty="0" smtClean="0"/>
+              <a:rPr lang="en-US" dirty="0"/>
               <a:t>.</a:t>
             </a:r>
           </a:p>
           <a:p>
             <a:pPr lvl="1"/>
-            <a:endParaRPr lang="en-US" dirty="0" smtClean="0"/>
+            <a:endParaRPr lang="en-US" dirty="0"/>
           </a:p>
           <a:p>
             <a:pPr lvl="1"/>
@@ -8922,13 +8772,6 @@
     <a:masterClrMapping/>
   </p:clrMapOvr>
   <p:transition/>
-  <p:timing>
-    <p:tnLst>
-      <p:par>
-        <p:cTn id="1" dur="indefinite" restart="never" nodeType="tmRoot"/>
-      </p:par>
-    </p:tnLst>
-  </p:timing>
 </p:sld>
 </file>
 
@@ -8965,10 +8808,9 @@
           <a:lstStyle/>
           <a:p>
             <a:r>
-              <a:rPr lang="en-US" dirty="0" smtClean="0"/>
+              <a:rPr lang="en-US" dirty="0"/>
               <a:t>Quick Basic Demo</a:t>
             </a:r>
-            <a:endParaRPr lang="en-US" dirty="0"/>
           </a:p>
         </p:txBody>
       </p:sp>
@@ -8988,37 +8830,36 @@
           <a:lstStyle/>
           <a:p>
             <a:r>
-              <a:rPr lang="en-US" dirty="0" smtClean="0"/>
+              <a:rPr lang="en-US" dirty="0"/>
               <a:t>The easy cases:</a:t>
             </a:r>
           </a:p>
           <a:p>
             <a:pPr lvl="1"/>
             <a:r>
-              <a:rPr lang="en-US" dirty="0" smtClean="0"/>
+              <a:rPr lang="en-US" dirty="0"/>
               <a:t>Single file with overlaps.</a:t>
             </a:r>
           </a:p>
           <a:p>
             <a:pPr lvl="1"/>
             <a:r>
-              <a:rPr lang="en-US" dirty="0" smtClean="0"/>
+              <a:rPr lang="en-US" dirty="0"/>
               <a:t>Two files w/some shared people (and overlaps).</a:t>
             </a:r>
           </a:p>
           <a:p>
             <a:pPr lvl="1"/>
             <a:r>
-              <a:rPr lang="en-US" dirty="0" smtClean="0"/>
+              <a:rPr lang="en-US" dirty="0"/>
               <a:t>Multiple files with duplicates.</a:t>
             </a:r>
           </a:p>
           <a:p>
             <a:r>
-              <a:rPr lang="en-US" dirty="0" smtClean="0"/>
+              <a:rPr lang="en-US" dirty="0"/>
               <a:t>All with only stock enroll variables.</a:t>
             </a:r>
-            <a:endParaRPr lang="en-US" dirty="0"/>
           </a:p>
         </p:txBody>
       </p:sp>
@@ -9033,13 +8874,6 @@
     <a:masterClrMapping/>
   </p:clrMapOvr>
   <p:transition/>
-  <p:timing>
-    <p:tnLst>
-      <p:par>
-        <p:cTn id="1" dur="indefinite" restart="never" nodeType="tmRoot"/>
-      </p:par>
-    </p:tnLst>
-  </p:timing>
 </p:sld>
 </file>
 
@@ -9124,24 +8958,24 @@
             <p:ph type="title"/>
           </p:nvPr>
         </p:nvSpPr>
-        <p:spPr/>
+        <p:spPr>
+          <a:xfrm rot="-4500000">
+            <a:off x="2139439" y="2815201"/>
+            <a:ext cx="3653319" cy="1695631"/>
+          </a:xfrm>
+        </p:spPr>
         <p:txBody>
           <a:bodyPr/>
           <a:lstStyle/>
           <a:p>
             <a:r>
-              <a:rPr lang="en-US" dirty="0" smtClean="0">
+              <a:rPr lang="en-US" dirty="0">
                 <a:solidFill>
                   <a:schemeClr val="bg2"/>
                 </a:solidFill>
               </a:rPr>
               <a:t>The Cascade Mountains</a:t>
             </a:r>
-            <a:endParaRPr lang="en-US" dirty="0">
-              <a:solidFill>
-                <a:schemeClr val="bg2"/>
-              </a:solidFill>
-            </a:endParaRPr>
           </a:p>
         </p:txBody>
       </p:sp>
@@ -9168,7 +9002,7 @@
           <a:lstStyle/>
           <a:p>
             <a:r>
-              <a:rPr lang="en-US" sz="2800" dirty="0" err="1" smtClean="0">
+              <a:rPr lang="en-US" sz="2800" dirty="0" err="1">
                 <a:solidFill>
                   <a:schemeClr val="bg2"/>
                 </a:solidFill>
@@ -9177,7 +9011,7 @@
               </a:rPr>
               <a:t>cascade_side</a:t>
             </a:r>
-            <a:endParaRPr lang="en-US" sz="2800" dirty="0" smtClean="0">
+            <a:endParaRPr lang="en-US" sz="2800" dirty="0">
               <a:solidFill>
                 <a:schemeClr val="bg2"/>
               </a:solidFill>
@@ -9187,7 +9021,7 @@
           </a:p>
           <a:p>
             <a:r>
-              <a:rPr lang="en-US" sz="2800" dirty="0" smtClean="0">
+              <a:rPr lang="en-US" sz="2800" dirty="0">
                 <a:solidFill>
                   <a:schemeClr val="bg2"/>
                 </a:solidFill>
@@ -9199,7 +9033,7 @@
           </a:p>
           <a:p>
             <a:r>
-              <a:rPr lang="en-US" sz="2800" dirty="0" smtClean="0">
+              <a:rPr lang="en-US" sz="2800" dirty="0">
                 <a:solidFill>
                   <a:schemeClr val="bg2"/>
                 </a:solidFill>
@@ -9211,7 +9045,7 @@
           </a:p>
           <a:p>
             <a:r>
-              <a:rPr lang="en-US" sz="2800" dirty="0" smtClean="0">
+              <a:rPr lang="en-US" sz="2800" dirty="0">
                 <a:solidFill>
                   <a:schemeClr val="bg2"/>
                 </a:solidFill>
@@ -9220,13 +9054,6 @@
               </a:rPr>
               <a:t>U = Unknown</a:t>
             </a:r>
-            <a:endParaRPr lang="en-US" sz="2800" dirty="0">
-              <a:solidFill>
-                <a:schemeClr val="bg2"/>
-              </a:solidFill>
-              <a:latin typeface="Consolas" panose="020B0609020204030204" pitchFamily="49" charset="0"/>
-              <a:cs typeface="Consolas" panose="020B0609020204030204" pitchFamily="49" charset="0"/>
-            </a:endParaRPr>
           </a:p>
         </p:txBody>
       </p:sp>
@@ -9241,13 +9068,6 @@
     <a:masterClrMapping/>
   </p:clrMapOvr>
   <p:transition/>
-  <p:timing>
-    <p:tnLst>
-      <p:par>
-        <p:cTn id="1" dur="indefinite" restart="never" nodeType="tmRoot"/>
-      </p:par>
-    </p:tnLst>
-  </p:timing>
 </p:sld>
 </file>
 
@@ -9284,10 +9104,9 @@
           <a:lstStyle/>
           <a:p>
             <a:r>
-              <a:rPr lang="en-US" dirty="0" smtClean="0"/>
+              <a:rPr lang="en-US" dirty="0"/>
               <a:t>How %de_overlap Works</a:t>
             </a:r>
-            <a:endParaRPr lang="en-US" dirty="0"/>
           </a:p>
         </p:txBody>
       </p:sp>
@@ -9309,56 +9128,55 @@
           <a:lstStyle/>
           <a:p>
             <a:r>
-              <a:rPr lang="en-US" dirty="0" smtClean="0"/>
+              <a:rPr lang="en-US" dirty="0"/>
               <a:t>Generates a set of all possible status change dates (starts/stops) for each person, given their specific data.</a:t>
             </a:r>
           </a:p>
           <a:p>
             <a:pPr lvl="1"/>
             <a:r>
-              <a:rPr lang="en-US" b="1" dirty="0" smtClean="0"/>
+              <a:rPr lang="en-US" b="1" dirty="0"/>
               <a:t>Not</a:t>
             </a:r>
             <a:r>
-              <a:rPr lang="en-US" dirty="0" smtClean="0"/>
+              <a:rPr lang="en-US" dirty="0"/>
               <a:t> every day, or every month—just one record per person per start and one per stop.</a:t>
             </a:r>
           </a:p>
           <a:p>
             <a:r>
-              <a:rPr lang="en-US" dirty="0" smtClean="0"/>
+              <a:rPr lang="en-US" dirty="0"/>
               <a:t>Joins the result to the input dataset, and takes max() values of each variable.</a:t>
             </a:r>
           </a:p>
           <a:p>
             <a:pPr lvl="1"/>
             <a:r>
-              <a:rPr lang="en-US" dirty="0" smtClean="0"/>
+              <a:rPr lang="en-US" dirty="0"/>
               <a:t>So you’ve got to work out how you want disparate values reconciled.</a:t>
             </a:r>
           </a:p>
           <a:p>
             <a:pPr lvl="1"/>
             <a:r>
-              <a:rPr lang="en-US" dirty="0" smtClean="0"/>
+              <a:rPr lang="en-US" dirty="0"/>
               <a:t>For quantitative vars it’s likely easy—plain max() (or min()).</a:t>
             </a:r>
           </a:p>
           <a:p>
             <a:pPr lvl="1"/>
             <a:r>
-              <a:rPr lang="en-US" dirty="0" smtClean="0"/>
+              <a:rPr lang="en-US" dirty="0"/>
               <a:t>For </a:t>
             </a:r>
             <a:r>
-              <a:rPr lang="en-US" dirty="0" err="1" smtClean="0"/>
+              <a:rPr lang="en-US" dirty="0" err="1"/>
               <a:t>qualitatives</a:t>
             </a:r>
             <a:r>
-              <a:rPr lang="en-US" dirty="0" smtClean="0"/>
+              <a:rPr lang="en-US" dirty="0"/>
               <a:t>, you’ve got to figure out which values you want to favor.</a:t>
             </a:r>
-            <a:endParaRPr lang="en-US" dirty="0"/>
           </a:p>
         </p:txBody>
       </p:sp>
@@ -9373,13 +9191,6 @@
     <a:masterClrMapping/>
   </p:clrMapOvr>
   <p:transition/>
-  <p:timing>
-    <p:tnLst>
-      <p:par>
-        <p:cTn id="1" dur="indefinite" restart="never" nodeType="tmRoot"/>
-      </p:par>
-    </p:tnLst>
-  </p:timing>
 </p:sld>
 </file>
 
@@ -9421,11 +9232,11 @@
           <a:lstStyle/>
           <a:p>
             <a:r>
-              <a:rPr lang="en-US" dirty="0" smtClean="0"/>
+              <a:rPr lang="en-US" dirty="0"/>
               <a:t>Qualitative </a:t>
             </a:r>
             <a:r>
-              <a:rPr lang="en-US" dirty="0" err="1" smtClean="0"/>
+              <a:rPr lang="en-US" dirty="0" err="1"/>
               <a:t>MAXing</a:t>
             </a:r>
             <a:endParaRPr lang="en-US" dirty="0"/>
@@ -9457,7 +9268,7 @@
               <a:buChar char="o"/>
             </a:pPr>
             <a:r>
-              <a:rPr lang="en-US" dirty="0" smtClean="0"/>
+              <a:rPr lang="en-US" dirty="0"/>
               <a:t>Use formats to translate alphas into numerics, and then back again.</a:t>
             </a:r>
           </a:p>
@@ -9467,10 +9278,9 @@
               <a:buChar char="o"/>
             </a:pPr>
             <a:r>
-              <a:rPr lang="en-US" dirty="0" smtClean="0"/>
+              <a:rPr lang="en-US" dirty="0"/>
               <a:t>For example:</a:t>
             </a:r>
-            <a:endParaRPr lang="en-US" dirty="0"/>
           </a:p>
         </p:txBody>
       </p:sp>
@@ -9647,13 +9457,6 @@
     <a:masterClrMapping/>
   </p:clrMapOvr>
   <p:transition/>
-  <p:timing>
-    <p:tnLst>
-      <p:par>
-        <p:cTn id="1" dur="indefinite" restart="never" nodeType="tmRoot"/>
-      </p:par>
-    </p:tnLst>
-  </p:timing>
 </p:sld>
 </file>
 
@@ -9690,10 +9493,9 @@
           <a:lstStyle/>
           <a:p>
             <a:r>
-              <a:rPr lang="en-US" dirty="0" smtClean="0"/>
+              <a:rPr lang="en-US" dirty="0"/>
               <a:t>Steps to Add a Variable</a:t>
             </a:r>
-            <a:endParaRPr lang="en-US" dirty="0"/>
           </a:p>
         </p:txBody>
       </p:sp>
@@ -9719,21 +9521,21 @@
               <a:buAutoNum type="arabicPeriod"/>
             </a:pPr>
             <a:r>
-              <a:rPr lang="en-US" dirty="0" smtClean="0"/>
+              <a:rPr lang="en-US" dirty="0"/>
               <a:t>Create formats if necessary:</a:t>
             </a:r>
           </a:p>
           <a:p>
             <a:pPr lvl="1"/>
             <a:r>
-              <a:rPr lang="en-US" dirty="0" smtClean="0"/>
+              <a:rPr lang="en-US" dirty="0"/>
               <a:t>Value -&gt; number</a:t>
             </a:r>
           </a:p>
           <a:p>
             <a:pPr lvl="1"/>
             <a:r>
-              <a:rPr lang="en-US" dirty="0" smtClean="0"/>
+              <a:rPr lang="en-US" dirty="0"/>
               <a:t>Number -&gt; value</a:t>
             </a:r>
           </a:p>
@@ -9743,7 +9545,7 @@
               <a:buAutoNum type="arabicPeriod"/>
             </a:pPr>
             <a:r>
-              <a:rPr lang="en-US" dirty="0" smtClean="0"/>
+              <a:rPr lang="en-US" dirty="0"/>
               <a:t>Add the put(max(put())) statement to the ‘penultimate’ SELECT (~line 158-190).</a:t>
             </a:r>
           </a:p>
@@ -9753,17 +9555,16 @@
               <a:buAutoNum type="arabicPeriod"/>
             </a:pPr>
             <a:r>
-              <a:rPr lang="en-US" dirty="0" smtClean="0"/>
+              <a:rPr lang="en-US" dirty="0"/>
               <a:t>Add the variable to the by-list in the &amp;outset data step.</a:t>
             </a:r>
           </a:p>
           <a:p>
             <a:pPr lvl="1"/>
             <a:r>
-              <a:rPr lang="en-US" dirty="0" smtClean="0"/>
+              <a:rPr lang="en-US" dirty="0"/>
               <a:t>Any place but last!</a:t>
             </a:r>
-            <a:endParaRPr lang="en-US" dirty="0"/>
           </a:p>
         </p:txBody>
       </p:sp>

</xml_diff>